<commit_message>
Fix case, naming in images and scale them
</commit_message>
<xml_diff>
--- a/Tutorials/images/build_microej_mono_sandbox_firmware_numbered.pptx
+++ b/Tutorials/images/build_microej_mono_sandbox_firmware_numbered.pptx
@@ -137,9 +137,7 @@
 
 <file path=ppt/commentAuthors.xml><?xml version="1.0" encoding="utf-8"?>
 <p:cmAuthorLst xmlns:a="http://schemas.openxmlformats.org/drawingml/2006/main" xmlns:r="http://schemas.openxmlformats.org/officeDocument/2006/relationships" xmlns:p="http://schemas.openxmlformats.org/presentationml/2006/main">
-  <p:cmAuthor id="1" name="Jérôme Leroux" initials="JL" lastIdx="10" clrIdx="0">
-    <p:extLst/>
-  </p:cmAuthor>
+  <p:cmAuthor id="1" name="Jérôme Leroux" initials="JL" lastIdx="10" clrIdx="0"/>
   <p:cmAuthor id="2" name="Rémy Louedec" initials="" lastIdx="0" clrIdx="1"/>
 </p:cmAuthorLst>
 </file>
@@ -236,7 +234,7 @@
               <a:rPr lang="fr-FR" smtClean="0">
                 <a:latin typeface="Calibri Regular" charset="0"/>
               </a:rPr>
-              <a:t>29/09/2020</a:t>
+              <a:t>05/10/2020</a:t>
             </a:fld>
             <a:endParaRPr lang="en-US" dirty="0">
               <a:latin typeface="Calibri Regular" charset="0"/>
@@ -424,7 +422,7 @@
           <a:p>
             <a:fld id="{D125E8DA-58CB-F841-A404-E11EC1E2C988}" type="datetime1">
               <a:rPr lang="fr-FR" smtClean="0"/>
-              <a:t>29/09/2020</a:t>
+              <a:t>05/10/2020</a:t>
             </a:fld>
             <a:endParaRPr lang="en-US" dirty="0"/>
           </a:p>
@@ -4497,7 +4495,7 @@
           <a:p>
             <a:fld id="{198ED07F-DFCB-4ABE-A311-845A3D30E5DB}" type="datetime7">
               <a:rPr lang="en-US" smtClean="0"/>
-              <a:t>Sep-20</a:t>
+              <a:t>Oct-20</a:t>
             </a:fld>
             <a:endParaRPr lang="en-US" dirty="0"/>
           </a:p>
@@ -28052,7 +28050,7 @@
           <p:cNvPr id="14" name="Slide Number Placeholder 5">
             <a:extLst>
               <a:ext uri="{FF2B5EF4-FFF2-40B4-BE49-F238E27FC236}">
-                <a16:creationId xmlns:a16="http://schemas.microsoft.com/office/drawing/2014/main" xmlns="" id="{D6A5EA0A-9DA9-564F-8F7D-CF263DB84C39}"/>
+                <a16:creationId xmlns:a16="http://schemas.microsoft.com/office/drawing/2014/main" id="{D6A5EA0A-9DA9-564F-8F7D-CF263DB84C39}"/>
               </a:ext>
             </a:extLst>
           </p:cNvPr>
@@ -28220,7 +28218,7 @@
           <p:cNvPr id="21" name="Straight Connector 20">
             <a:extLst>
               <a:ext uri="{FF2B5EF4-FFF2-40B4-BE49-F238E27FC236}">
-                <a16:creationId xmlns:a16="http://schemas.microsoft.com/office/drawing/2014/main" xmlns="" id="{F4443C96-B82D-F449-A71B-02134B6BB207}"/>
+                <a16:creationId xmlns:a16="http://schemas.microsoft.com/office/drawing/2014/main" id="{F4443C96-B82D-F449-A71B-02134B6BB207}"/>
               </a:ext>
             </a:extLst>
           </p:cNvPr>
@@ -28886,7 +28884,7 @@
           <p:cNvPr id="14" name="Slide Number Placeholder 5">
             <a:extLst>
               <a:ext uri="{FF2B5EF4-FFF2-40B4-BE49-F238E27FC236}">
-                <a16:creationId xmlns:a16="http://schemas.microsoft.com/office/drawing/2014/main" xmlns="" id="{D6A5EA0A-9DA9-564F-8F7D-CF263DB84C39}"/>
+                <a16:creationId xmlns:a16="http://schemas.microsoft.com/office/drawing/2014/main" id="{D6A5EA0A-9DA9-564F-8F7D-CF263DB84C39}"/>
               </a:ext>
             </a:extLst>
           </p:cNvPr>
@@ -29054,7 +29052,7 @@
           <p:cNvPr id="21" name="Straight Connector 20">
             <a:extLst>
               <a:ext uri="{FF2B5EF4-FFF2-40B4-BE49-F238E27FC236}">
-                <a16:creationId xmlns:a16="http://schemas.microsoft.com/office/drawing/2014/main" xmlns="" id="{F4443C96-B82D-F449-A71B-02134B6BB207}"/>
+                <a16:creationId xmlns:a16="http://schemas.microsoft.com/office/drawing/2014/main" id="{F4443C96-B82D-F449-A71B-02134B6BB207}"/>
               </a:ext>
             </a:extLst>
           </p:cNvPr>
@@ -29140,7 +29138,7 @@
           <p:cNvPr id="6" name="Slide Number Placeholder 5">
             <a:extLst>
               <a:ext uri="{FF2B5EF4-FFF2-40B4-BE49-F238E27FC236}">
-                <a16:creationId xmlns:a16="http://schemas.microsoft.com/office/drawing/2014/main" xmlns="" id="{D6A5EA0A-9DA9-564F-8F7D-CF263DB84C39}"/>
+                <a16:creationId xmlns:a16="http://schemas.microsoft.com/office/drawing/2014/main" id="{D6A5EA0A-9DA9-564F-8F7D-CF263DB84C39}"/>
               </a:ext>
             </a:extLst>
           </p:cNvPr>
@@ -29308,7 +29306,7 @@
           <p:cNvPr id="8" name="Straight Connector 7">
             <a:extLst>
               <a:ext uri="{FF2B5EF4-FFF2-40B4-BE49-F238E27FC236}">
-                <a16:creationId xmlns:a16="http://schemas.microsoft.com/office/drawing/2014/main" xmlns="" id="{F4443C96-B82D-F449-A71B-02134B6BB207}"/>
+                <a16:creationId xmlns:a16="http://schemas.microsoft.com/office/drawing/2014/main" id="{F4443C96-B82D-F449-A71B-02134B6BB207}"/>
               </a:ext>
             </a:extLst>
           </p:cNvPr>
@@ -30142,7 +30140,7 @@
           <p:cNvPr id="14" name="Slide Number Placeholder 5">
             <a:extLst>
               <a:ext uri="{FF2B5EF4-FFF2-40B4-BE49-F238E27FC236}">
-                <a16:creationId xmlns:a16="http://schemas.microsoft.com/office/drawing/2014/main" xmlns="" id="{D6A5EA0A-9DA9-564F-8F7D-CF263DB84C39}"/>
+                <a16:creationId xmlns:a16="http://schemas.microsoft.com/office/drawing/2014/main" id="{D6A5EA0A-9DA9-564F-8F7D-CF263DB84C39}"/>
               </a:ext>
             </a:extLst>
           </p:cNvPr>
@@ -30310,7 +30308,7 @@
           <p:cNvPr id="21" name="Straight Connector 20">
             <a:extLst>
               <a:ext uri="{FF2B5EF4-FFF2-40B4-BE49-F238E27FC236}">
-                <a16:creationId xmlns:a16="http://schemas.microsoft.com/office/drawing/2014/main" xmlns="" id="{F4443C96-B82D-F449-A71B-02134B6BB207}"/>
+                <a16:creationId xmlns:a16="http://schemas.microsoft.com/office/drawing/2014/main" id="{F4443C96-B82D-F449-A71B-02134B6BB207}"/>
               </a:ext>
             </a:extLst>
           </p:cNvPr>
@@ -30396,7 +30394,7 @@
           <p:cNvPr id="6" name="Slide Number Placeholder 5">
             <a:extLst>
               <a:ext uri="{FF2B5EF4-FFF2-40B4-BE49-F238E27FC236}">
-                <a16:creationId xmlns:a16="http://schemas.microsoft.com/office/drawing/2014/main" xmlns="" id="{D6A5EA0A-9DA9-564F-8F7D-CF263DB84C39}"/>
+                <a16:creationId xmlns:a16="http://schemas.microsoft.com/office/drawing/2014/main" id="{D6A5EA0A-9DA9-564F-8F7D-CF263DB84C39}"/>
               </a:ext>
             </a:extLst>
           </p:cNvPr>
@@ -30564,7 +30562,7 @@
           <p:cNvPr id="8" name="Straight Connector 7">
             <a:extLst>
               <a:ext uri="{FF2B5EF4-FFF2-40B4-BE49-F238E27FC236}">
-                <a16:creationId xmlns:a16="http://schemas.microsoft.com/office/drawing/2014/main" xmlns="" id="{F4443C96-B82D-F449-A71B-02134B6BB207}"/>
+                <a16:creationId xmlns:a16="http://schemas.microsoft.com/office/drawing/2014/main" id="{F4443C96-B82D-F449-A71B-02134B6BB207}"/>
               </a:ext>
             </a:extLst>
           </p:cNvPr>
@@ -31398,7 +31396,7 @@
           <p:cNvPr id="14" name="Slide Number Placeholder 5">
             <a:extLst>
               <a:ext uri="{FF2B5EF4-FFF2-40B4-BE49-F238E27FC236}">
-                <a16:creationId xmlns:a16="http://schemas.microsoft.com/office/drawing/2014/main" xmlns="" id="{D6A5EA0A-9DA9-564F-8F7D-CF263DB84C39}"/>
+                <a16:creationId xmlns:a16="http://schemas.microsoft.com/office/drawing/2014/main" id="{D6A5EA0A-9DA9-564F-8F7D-CF263DB84C39}"/>
               </a:ext>
             </a:extLst>
           </p:cNvPr>
@@ -31566,7 +31564,7 @@
           <p:cNvPr id="21" name="Straight Connector 20">
             <a:extLst>
               <a:ext uri="{FF2B5EF4-FFF2-40B4-BE49-F238E27FC236}">
-                <a16:creationId xmlns:a16="http://schemas.microsoft.com/office/drawing/2014/main" xmlns="" id="{F4443C96-B82D-F449-A71B-02134B6BB207}"/>
+                <a16:creationId xmlns:a16="http://schemas.microsoft.com/office/drawing/2014/main" id="{F4443C96-B82D-F449-A71B-02134B6BB207}"/>
               </a:ext>
             </a:extLst>
           </p:cNvPr>
@@ -31652,7 +31650,7 @@
           <p:cNvPr id="6" name="Slide Number Placeholder 5">
             <a:extLst>
               <a:ext uri="{FF2B5EF4-FFF2-40B4-BE49-F238E27FC236}">
-                <a16:creationId xmlns:a16="http://schemas.microsoft.com/office/drawing/2014/main" xmlns="" id="{D6A5EA0A-9DA9-564F-8F7D-CF263DB84C39}"/>
+                <a16:creationId xmlns:a16="http://schemas.microsoft.com/office/drawing/2014/main" id="{D6A5EA0A-9DA9-564F-8F7D-CF263DB84C39}"/>
               </a:ext>
             </a:extLst>
           </p:cNvPr>
@@ -31820,7 +31818,7 @@
           <p:cNvPr id="8" name="Straight Connector 7">
             <a:extLst>
               <a:ext uri="{FF2B5EF4-FFF2-40B4-BE49-F238E27FC236}">
-                <a16:creationId xmlns:a16="http://schemas.microsoft.com/office/drawing/2014/main" xmlns="" id="{F4443C96-B82D-F449-A71B-02134B6BB207}"/>
+                <a16:creationId xmlns:a16="http://schemas.microsoft.com/office/drawing/2014/main" id="{F4443C96-B82D-F449-A71B-02134B6BB207}"/>
               </a:ext>
             </a:extLst>
           </p:cNvPr>
@@ -32825,21 +32823,8 @@
                   <a:srgbClr val="97A7AF"/>
                 </a:solidFill>
               </a:rPr>
-              <a:t>(.a, .</a:t>
-            </a:r>
-            <a:r>
-              <a:rPr lang="en-US" sz="1000" dirty="0" smtClean="0">
-                <a:solidFill>
-                  <a:srgbClr val="97A7AF"/>
-                </a:solidFill>
-              </a:rPr>
-              <a:t>jar)</a:t>
-            </a:r>
-            <a:endParaRPr lang="en-US" sz="1000" dirty="0">
-              <a:solidFill>
-                <a:srgbClr val="97A7AF"/>
-              </a:solidFill>
-            </a:endParaRPr>
+              <a:t>(.a, .jar)</a:t>
+            </a:r>
           </a:p>
         </p:txBody>
       </p:sp>
@@ -33034,20 +33019,12 @@
               <a:defRPr/>
             </a:pPr>
             <a:r>
-              <a:rPr lang="en-US" sz="1000" dirty="0" smtClean="0">
+              <a:rPr lang="en-US" sz="1000" dirty="0">
                 <a:solidFill>
                   <a:srgbClr val="97A7AF"/>
                 </a:solidFill>
               </a:rPr>
-              <a:t>(.</a:t>
-            </a:r>
-            <a:r>
-              <a:rPr lang="en-US" sz="1000" dirty="0">
-                <a:solidFill>
-                  <a:srgbClr val="97A7AF"/>
-                </a:solidFill>
-              </a:rPr>
-              <a:t>jar)</a:t>
+              <a:t>(.jar)</a:t>
             </a:r>
           </a:p>
         </p:txBody>
@@ -33167,19 +33144,8 @@
             <a:pPr algn="ctr">
               <a:defRPr/>
             </a:pPr>
-            <a:r>
-              <a:rPr lang="en-US" sz="1000" dirty="0" smtClean="0">
-                <a:solidFill>
-                  <a:srgbClr val="FFFFFF"/>
-                </a:solidFill>
-                <a:latin typeface="Source Sans Pro Light" charset="0"/>
-                <a:ea typeface="Source Sans Pro Light" charset="0"/>
-                <a:cs typeface="Source Sans Pro Light" charset="0"/>
-              </a:rPr>
-              <a:t/>
-            </a:r>
             <a:br>
-              <a:rPr lang="en-US" sz="1000" dirty="0" smtClean="0">
+              <a:rPr lang="en-US" sz="1000" dirty="0">
                 <a:solidFill>
                   <a:srgbClr val="FFFFFF"/>
                 </a:solidFill>
@@ -33188,19 +33154,8 @@
                 <a:cs typeface="Source Sans Pro Light" charset="0"/>
               </a:rPr>
             </a:br>
-            <a:r>
-              <a:rPr lang="en-US" sz="1000" dirty="0" smtClean="0">
-                <a:solidFill>
-                  <a:srgbClr val="FFFFFF"/>
-                </a:solidFill>
-                <a:latin typeface="Source Sans Pro Light" charset="0"/>
-                <a:ea typeface="Source Sans Pro Light" charset="0"/>
-                <a:cs typeface="Source Sans Pro Light" charset="0"/>
-              </a:rPr>
-              <a:t/>
-            </a:r>
             <a:br>
-              <a:rPr lang="en-US" sz="1000" dirty="0" smtClean="0">
+              <a:rPr lang="en-US" sz="1000" dirty="0">
                 <a:solidFill>
                   <a:srgbClr val="FFFFFF"/>
                 </a:solidFill>
@@ -33209,19 +33164,8 @@
                 <a:cs typeface="Source Sans Pro Light" charset="0"/>
               </a:rPr>
             </a:br>
-            <a:r>
-              <a:rPr lang="en-US" sz="1000" dirty="0" smtClean="0">
-                <a:solidFill>
-                  <a:srgbClr val="FFFFFF"/>
-                </a:solidFill>
-                <a:latin typeface="Source Sans Pro Light" charset="0"/>
-                <a:ea typeface="Source Sans Pro Light" charset="0"/>
-                <a:cs typeface="Source Sans Pro Light" charset="0"/>
-              </a:rPr>
-              <a:t/>
-            </a:r>
             <a:br>
-              <a:rPr lang="en-US" sz="1000" dirty="0" smtClean="0">
+              <a:rPr lang="en-US" sz="1000" dirty="0">
                 <a:solidFill>
                   <a:srgbClr val="FFFFFF"/>
                 </a:solidFill>
@@ -33230,19 +33174,8 @@
                 <a:cs typeface="Source Sans Pro Light" charset="0"/>
               </a:rPr>
             </a:br>
-            <a:r>
-              <a:rPr lang="en-US" sz="1000" dirty="0" smtClean="0">
-                <a:solidFill>
-                  <a:srgbClr val="FFFFFF"/>
-                </a:solidFill>
-                <a:latin typeface="Source Sans Pro Light" charset="0"/>
-                <a:ea typeface="Source Sans Pro Light" charset="0"/>
-                <a:cs typeface="Source Sans Pro Light" charset="0"/>
-              </a:rPr>
-              <a:t/>
-            </a:r>
             <a:br>
-              <a:rPr lang="en-US" sz="1000" dirty="0" smtClean="0">
+              <a:rPr lang="en-US" sz="1000" dirty="0">
                 <a:solidFill>
                   <a:srgbClr val="FFFFFF"/>
                 </a:solidFill>
@@ -33251,7 +33184,7 @@
                 <a:cs typeface="Source Sans Pro Light" charset="0"/>
               </a:rPr>
             </a:br>
-            <a:endParaRPr lang="en-US" sz="1000" dirty="0" smtClean="0">
+            <a:endParaRPr lang="en-US" sz="1000" dirty="0">
               <a:solidFill>
                 <a:srgbClr val="FFFFFF"/>
               </a:solidFill>
@@ -33264,7 +33197,7 @@
             <a:pPr algn="ctr">
               <a:defRPr/>
             </a:pPr>
-            <a:endParaRPr lang="en-US" sz="1000" dirty="0" smtClean="0">
+            <a:endParaRPr lang="en-US" sz="1000" dirty="0">
               <a:solidFill>
                 <a:srgbClr val="FFFFFF"/>
               </a:solidFill>
@@ -33729,7 +33662,7 @@
           <p:nvPr/>
         </p:nvPicPr>
         <p:blipFill>
-          <a:blip r:embed="rId2">
+          <a:blip r:embed="rId2" cstate="print">
             <a:extLst>
               <a:ext uri="{28A0092B-C50C-407E-A947-70E740481C1C}">
                 <a14:useLocalDpi xmlns:a14="http://schemas.microsoft.com/office/drawing/2010/main" val="0"/>
@@ -34204,7 +34137,7 @@
           <p:cNvPr id="91" name="Connecteur droit avec flèche 149">
             <a:extLst>
               <a:ext uri="{FF2B5EF4-FFF2-40B4-BE49-F238E27FC236}">
-                <a16:creationId xmlns:a16="http://schemas.microsoft.com/office/drawing/2014/main" xmlns="" id="{ED76A057-C789-4B13-AF66-FCF64679A599}"/>
+                <a16:creationId xmlns:a16="http://schemas.microsoft.com/office/drawing/2014/main" id="{ED76A057-C789-4B13-AF66-FCF64679A599}"/>
               </a:ext>
             </a:extLst>
           </p:cNvPr>
@@ -34302,7 +34235,7 @@
             <p:nvPr/>
           </p:nvPicPr>
           <p:blipFill>
-            <a:blip r:embed="rId3">
+            <a:blip r:embed="rId3" cstate="print">
               <a:extLst>
                 <a:ext uri="{28A0092B-C50C-407E-A947-70E740481C1C}">
                   <a14:useLocalDpi xmlns:a14="http://schemas.microsoft.com/office/drawing/2010/main" val="0"/>
@@ -34354,7 +34287,7 @@
                 </a:spcAft>
               </a:pPr>
               <a:r>
-                <a:rPr lang="en-US" sz="2400" spc="0" dirty="0" smtClean="0">
+                <a:rPr lang="en-US" sz="2400" spc="0" dirty="0">
                   <a:ln>
                     <a:noFill/>
                   </a:ln>
@@ -34394,7 +34327,7 @@
             <p:nvPr/>
           </p:nvPicPr>
           <p:blipFill>
-            <a:blip r:embed="rId3">
+            <a:blip r:embed="rId3" cstate="print">
               <a:extLst>
                 <a:ext uri="{28A0092B-C50C-407E-A947-70E740481C1C}">
                   <a14:useLocalDpi xmlns:a14="http://schemas.microsoft.com/office/drawing/2010/main" val="0"/>
@@ -34446,7 +34379,7 @@
                 </a:spcAft>
               </a:pPr>
               <a:r>
-                <a:rPr lang="en-US" sz="2400" spc="0" dirty="0" smtClean="0">
+                <a:rPr lang="en-US" sz="2400" spc="0" dirty="0">
                   <a:ln>
                     <a:noFill/>
                   </a:ln>
@@ -34486,7 +34419,7 @@
             <p:nvPr/>
           </p:nvPicPr>
           <p:blipFill>
-            <a:blip r:embed="rId3">
+            <a:blip r:embed="rId3" cstate="print">
               <a:extLst>
                 <a:ext uri="{28A0092B-C50C-407E-A947-70E740481C1C}">
                   <a14:useLocalDpi xmlns:a14="http://schemas.microsoft.com/office/drawing/2010/main" val="0"/>
@@ -34538,7 +34471,7 @@
                 </a:spcAft>
               </a:pPr>
               <a:r>
-                <a:rPr lang="en-US" sz="2400" spc="0" dirty="0" smtClean="0">
+                <a:rPr lang="en-US" sz="2400" spc="0" dirty="0">
                   <a:ln>
                     <a:noFill/>
                   </a:ln>
@@ -34715,6 +34648,17 @@
             <a:p>
               <a:pPr algn="ctr"/>
               <a:r>
+                <a:rPr lang="en-US" sz="1000">
+                  <a:solidFill>
+                    <a:schemeClr val="bg1"/>
+                  </a:solidFill>
+                  <a:latin typeface="Source Sans Pro Light" charset="0"/>
+                  <a:ea typeface="Source Sans Pro Light" charset="0"/>
+                  <a:cs typeface="Source Sans Pro Light" charset="0"/>
+                </a:rPr>
+                <a:t>Abstraction </a:t>
+              </a:r>
+              <a:r>
                 <a:rPr lang="en-US" sz="1000" dirty="0">
                   <a:solidFill>
                     <a:schemeClr val="bg1"/>
@@ -34723,7 +34667,7 @@
                   <a:ea typeface="Source Sans Pro Light" charset="0"/>
                   <a:cs typeface="Source Sans Pro Light" charset="0"/>
                 </a:rPr>
-                <a:t>Adaptation Layer</a:t>
+                <a:t>Layer</a:t>
               </a:r>
             </a:p>
             <a:p>
@@ -35063,7 +35007,7 @@
             <p:cNvPr id="111" name="Bande diagonale 191">
               <a:extLst>
                 <a:ext uri="{FF2B5EF4-FFF2-40B4-BE49-F238E27FC236}">
-                  <a16:creationId xmlns:a16="http://schemas.microsoft.com/office/drawing/2014/main" xmlns="" id="{DAA7A729-6342-4FAC-9943-95D96FF2DD80}"/>
+                  <a16:creationId xmlns:a16="http://schemas.microsoft.com/office/drawing/2014/main" id="{DAA7A729-6342-4FAC-9943-95D96FF2DD80}"/>
                 </a:ext>
               </a:extLst>
             </p:cNvPr>
@@ -35125,7 +35069,7 @@
             <p:cNvPr id="112" name="ZoneTexte 180">
               <a:extLst>
                 <a:ext uri="{FF2B5EF4-FFF2-40B4-BE49-F238E27FC236}">
-                  <a16:creationId xmlns:a16="http://schemas.microsoft.com/office/drawing/2014/main" xmlns="" id="{5BB884F8-E56F-40DE-BF31-76BF3D0D1275}"/>
+                  <a16:creationId xmlns:a16="http://schemas.microsoft.com/office/drawing/2014/main" id="{5BB884F8-E56F-40DE-BF31-76BF3D0D1275}"/>
                 </a:ext>
               </a:extLst>
             </p:cNvPr>
@@ -35515,7 +35459,7 @@
                 <a:defRPr/>
               </a:pPr>
               <a:r>
-                <a:rPr lang="en-US" sz="900" dirty="0" smtClean="0">
+                <a:rPr lang="en-US" sz="900" dirty="0">
                   <a:solidFill>
                     <a:srgbClr val="FFFFFF"/>
                   </a:solidFill>
@@ -35525,14 +35469,6 @@
                 </a:rPr>
                 <a:t>bin</a:t>
               </a:r>
-              <a:endParaRPr lang="en-US" sz="900" dirty="0">
-                <a:solidFill>
-                  <a:srgbClr val="FFFFFF"/>
-                </a:solidFill>
-                <a:latin typeface="Source Sans Pro Light" charset="0"/>
-                <a:ea typeface="Source Sans Pro Light" charset="0"/>
-                <a:cs typeface="Source Sans Pro Light" charset="0"/>
-              </a:endParaRPr>
             </a:p>
           </p:txBody>
         </p:sp>
@@ -35556,7 +35492,7 @@
             <p:cNvPr id="123" name="Bande diagonale 191">
               <a:extLst>
                 <a:ext uri="{FF2B5EF4-FFF2-40B4-BE49-F238E27FC236}">
-                  <a16:creationId xmlns:a16="http://schemas.microsoft.com/office/drawing/2014/main" xmlns="" id="{DAA7A729-6342-4FAC-9943-95D96FF2DD80}"/>
+                  <a16:creationId xmlns:a16="http://schemas.microsoft.com/office/drawing/2014/main" id="{DAA7A729-6342-4FAC-9943-95D96FF2DD80}"/>
                 </a:ext>
               </a:extLst>
             </p:cNvPr>
@@ -35618,7 +35554,7 @@
             <p:cNvPr id="124" name="ZoneTexte 180">
               <a:extLst>
                 <a:ext uri="{FF2B5EF4-FFF2-40B4-BE49-F238E27FC236}">
-                  <a16:creationId xmlns:a16="http://schemas.microsoft.com/office/drawing/2014/main" xmlns="" id="{5BB884F8-E56F-40DE-BF31-76BF3D0D1275}"/>
+                  <a16:creationId xmlns:a16="http://schemas.microsoft.com/office/drawing/2014/main" id="{5BB884F8-E56F-40DE-BF31-76BF3D0D1275}"/>
                 </a:ext>
               </a:extLst>
             </p:cNvPr>
@@ -35645,7 +35581,7 @@
                 <a:defRPr/>
               </a:pPr>
               <a:r>
-                <a:rPr lang="en-US" sz="900" dirty="0" smtClean="0">
+                <a:rPr lang="en-US" sz="900" dirty="0">
                   <a:solidFill>
                     <a:schemeClr val="bg1"/>
                   </a:solidFill>
@@ -35655,14 +35591,6 @@
                 </a:rPr>
                 <a:t>bin</a:t>
               </a:r>
-              <a:endParaRPr lang="en-US" sz="900" dirty="0">
-                <a:solidFill>
-                  <a:schemeClr val="bg1"/>
-                </a:solidFill>
-                <a:latin typeface="Source Sans Pro Light" charset="0"/>
-                <a:ea typeface="Source Sans Pro Light" charset="0"/>
-                <a:cs typeface="Source Sans Pro Light" charset="0"/>
-              </a:endParaRPr>
             </a:p>
           </p:txBody>
         </p:sp>

</xml_diff>